<commit_message>
updating thumbnail for yt
</commit_message>
<xml_diff>
--- a/thumbnail.pptx
+++ b/thumbnail.pptx
@@ -6,6 +6,7 @@
   </p:sldMasterIdLst>
   <p:sldIdLst>
     <p:sldId id="256" r:id="rId2"/>
+    <p:sldId id="257" r:id="rId3"/>
   </p:sldIdLst>
   <p:sldSz cx="12192000" cy="6858000"/>
   <p:notesSz cx="6858000" cy="9144000"/>
@@ -600,7 +601,7 @@
           <a:p>
             <a:fld id="{72345051-2045-45DA-935E-2E3CA1A69ADC}" type="datetimeFigureOut">
               <a:rPr lang="en-US" smtClean="0"/>
-              <a:t>2/20/2023</a:t>
+              <a:t>3/1/2023</a:t>
             </a:fld>
             <a:endParaRPr lang="en-US" dirty="0"/>
           </a:p>
@@ -798,7 +799,7 @@
           <a:p>
             <a:fld id="{72345051-2045-45DA-935E-2E3CA1A69ADC}" type="datetimeFigureOut">
               <a:rPr lang="en-US" smtClean="0"/>
-              <a:t>2/20/2023</a:t>
+              <a:t>3/1/2023</a:t>
             </a:fld>
             <a:endParaRPr lang="en-US"/>
           </a:p>
@@ -1006,7 +1007,7 @@
           <a:p>
             <a:fld id="{72345051-2045-45DA-935E-2E3CA1A69ADC}" type="datetimeFigureOut">
               <a:rPr lang="en-US" smtClean="0"/>
-              <a:t>2/20/2023</a:t>
+              <a:t>3/1/2023</a:t>
             </a:fld>
             <a:endParaRPr lang="en-US"/>
           </a:p>
@@ -1228,7 +1229,7 @@
           <a:p>
             <a:fld id="{72345051-2045-45DA-935E-2E3CA1A69ADC}" type="datetimeFigureOut">
               <a:rPr lang="en-US" smtClean="0"/>
-              <a:t>2/20/2023</a:t>
+              <a:t>3/1/2023</a:t>
             </a:fld>
             <a:endParaRPr lang="en-US"/>
           </a:p>
@@ -2139,7 +2140,7 @@
           <a:p>
             <a:fld id="{72345051-2045-45DA-935E-2E3CA1A69ADC}" type="datetimeFigureOut">
               <a:rPr lang="en-US" smtClean="0"/>
-              <a:t>2/20/2023</a:t>
+              <a:t>3/1/2023</a:t>
             </a:fld>
             <a:endParaRPr lang="en-US"/>
           </a:p>
@@ -2742,7 +2743,7 @@
           <a:p>
             <a:fld id="{72345051-2045-45DA-935E-2E3CA1A69ADC}" type="datetimeFigureOut">
               <a:rPr lang="en-US" smtClean="0"/>
-              <a:t>2/20/2023</a:t>
+              <a:t>3/1/2023</a:t>
             </a:fld>
             <a:endParaRPr lang="en-US"/>
           </a:p>
@@ -3790,7 +3791,7 @@
           <a:p>
             <a:fld id="{72345051-2045-45DA-935E-2E3CA1A69ADC}" type="datetimeFigureOut">
               <a:rPr lang="en-US" smtClean="0"/>
-              <a:t>2/20/2023</a:t>
+              <a:t>3/1/2023</a:t>
             </a:fld>
             <a:endParaRPr lang="en-US"/>
           </a:p>
@@ -4574,7 +4575,7 @@
           <a:p>
             <a:fld id="{72345051-2045-45DA-935E-2E3CA1A69ADC}" type="datetimeFigureOut">
               <a:rPr lang="en-US" smtClean="0"/>
-              <a:t>2/20/2023</a:t>
+              <a:t>3/1/2023</a:t>
             </a:fld>
             <a:endParaRPr lang="en-US"/>
           </a:p>
@@ -5023,7 +5024,7 @@
           <a:p>
             <a:fld id="{72345051-2045-45DA-935E-2E3CA1A69ADC}" type="datetimeFigureOut">
               <a:rPr lang="en-US" smtClean="0"/>
-              <a:t>2/20/2023</a:t>
+              <a:t>3/1/2023</a:t>
             </a:fld>
             <a:endParaRPr lang="en-US"/>
           </a:p>
@@ -5340,7 +5341,7 @@
           <a:p>
             <a:fld id="{72345051-2045-45DA-935E-2E3CA1A69ADC}" type="datetimeFigureOut">
               <a:rPr lang="en-US" smtClean="0"/>
-              <a:t>2/20/2023</a:t>
+              <a:t>3/1/2023</a:t>
             </a:fld>
             <a:endParaRPr lang="en-US"/>
           </a:p>
@@ -5968,7 +5969,7 @@
           <a:p>
             <a:fld id="{72345051-2045-45DA-935E-2E3CA1A69ADC}" type="datetimeFigureOut">
               <a:rPr lang="en-US" smtClean="0"/>
-              <a:t>2/20/2023</a:t>
+              <a:t>3/1/2023</a:t>
             </a:fld>
             <a:endParaRPr lang="en-US"/>
           </a:p>
@@ -6541,7 +6542,7 @@
           <a:p>
             <a:fld id="{72345051-2045-45DA-935E-2E3CA1A69ADC}" type="datetimeFigureOut">
               <a:rPr lang="en-US" smtClean="0"/>
-              <a:t>2/20/2023</a:t>
+              <a:t>3/1/2023</a:t>
             </a:fld>
             <a:endParaRPr lang="en-US" dirty="0"/>
           </a:p>
@@ -8758,6 +8759,1992 @@
 </p:sld>
 </file>
 
+<file path=ppt/slides/slide2.xml><?xml version="1.0" encoding="utf-8"?>
+<p:sld xmlns:a="http://schemas.openxmlformats.org/drawingml/2006/main" xmlns:r="http://schemas.openxmlformats.org/officeDocument/2006/relationships" xmlns:p="http://schemas.openxmlformats.org/presentationml/2006/main">
+  <p:cSld>
+    <p:bg>
+      <p:bgPr>
+        <a:solidFill>
+          <a:schemeClr val="tx1">
+            <a:lumMod val="85000"/>
+            <a:lumOff val="15000"/>
+          </a:schemeClr>
+        </a:solidFill>
+        <a:effectLst/>
+      </p:bgPr>
+    </p:bg>
+    <p:spTree>
+      <p:nvGrpSpPr>
+        <p:cNvPr id="1" name=""/>
+        <p:cNvGrpSpPr/>
+        <p:nvPr/>
+      </p:nvGrpSpPr>
+      <p:grpSpPr>
+        <a:xfrm>
+          <a:off x="0" y="0"/>
+          <a:ext cx="0" cy="0"/>
+          <a:chOff x="0" y="0"/>
+          <a:chExt cx="0" cy="0"/>
+        </a:xfrm>
+      </p:grpSpPr>
+      <p:sp>
+        <p:nvSpPr>
+          <p:cNvPr id="15" name="Rectangle 6">
+            <a:extLst>
+              <a:ext uri="{FF2B5EF4-FFF2-40B4-BE49-F238E27FC236}">
+                <a16:creationId xmlns:a16="http://schemas.microsoft.com/office/drawing/2014/main" id="{DA381740-063A-41A4-836D-85D14980EEF0}"/>
+              </a:ext>
+              <a:ext uri="{C183D7F6-B498-43B3-948B-1728B52AA6E4}">
+                <adec:decorative xmlns:adec="http://schemas.microsoft.com/office/drawing/2017/decorative" val="1"/>
+              </a:ext>
+            </a:extLst>
+          </p:cNvPr>
+          <p:cNvSpPr>
+            <a:spLocks noGrp="1" noRot="1" noChangeAspect="1" noMove="1" noResize="1" noEditPoints="1" noAdjustHandles="1" noChangeArrowheads="1" noChangeShapeType="1" noTextEdit="1"/>
+          </p:cNvSpPr>
+          <p:nvPr>
+            <p:extLst>
+              <p:ext uri="{386F3935-93C4-4BCD-93E2-E3B085C9AB24}">
+                <p16:designElem xmlns:p16="http://schemas.microsoft.com/office/powerpoint/2015/main" val="1"/>
+              </p:ext>
+            </p:extLst>
+          </p:nvPr>
+        </p:nvSpPr>
+        <p:spPr>
+          <a:xfrm>
+            <a:off x="838200" y="4736883"/>
+            <a:ext cx="4243589" cy="27432"/>
+          </a:xfrm>
+          <a:custGeom>
+            <a:avLst/>
+            <a:gdLst>
+              <a:gd name="connsiteX0" fmla="*/ 0 w 4243589"/>
+              <a:gd name="connsiteY0" fmla="*/ 0 h 27432"/>
+              <a:gd name="connsiteX1" fmla="*/ 563791 w 4243589"/>
+              <a:gd name="connsiteY1" fmla="*/ 0 h 27432"/>
+              <a:gd name="connsiteX2" fmla="*/ 1042710 w 4243589"/>
+              <a:gd name="connsiteY2" fmla="*/ 0 h 27432"/>
+              <a:gd name="connsiteX3" fmla="*/ 1564066 w 4243589"/>
+              <a:gd name="connsiteY3" fmla="*/ 0 h 27432"/>
+              <a:gd name="connsiteX4" fmla="*/ 2212729 w 4243589"/>
+              <a:gd name="connsiteY4" fmla="*/ 0 h 27432"/>
+              <a:gd name="connsiteX5" fmla="*/ 2776520 w 4243589"/>
+              <a:gd name="connsiteY5" fmla="*/ 0 h 27432"/>
+              <a:gd name="connsiteX6" fmla="*/ 3297875 w 4243589"/>
+              <a:gd name="connsiteY6" fmla="*/ 0 h 27432"/>
+              <a:gd name="connsiteX7" fmla="*/ 4243589 w 4243589"/>
+              <a:gd name="connsiteY7" fmla="*/ 0 h 27432"/>
+              <a:gd name="connsiteX8" fmla="*/ 4243589 w 4243589"/>
+              <a:gd name="connsiteY8" fmla="*/ 27432 h 27432"/>
+              <a:gd name="connsiteX9" fmla="*/ 3637362 w 4243589"/>
+              <a:gd name="connsiteY9" fmla="*/ 27432 h 27432"/>
+              <a:gd name="connsiteX10" fmla="*/ 3116007 w 4243589"/>
+              <a:gd name="connsiteY10" fmla="*/ 27432 h 27432"/>
+              <a:gd name="connsiteX11" fmla="*/ 2424908 w 4243589"/>
+              <a:gd name="connsiteY11" fmla="*/ 27432 h 27432"/>
+              <a:gd name="connsiteX12" fmla="*/ 1861117 w 4243589"/>
+              <a:gd name="connsiteY12" fmla="*/ 27432 h 27432"/>
+              <a:gd name="connsiteX13" fmla="*/ 1382198 w 4243589"/>
+              <a:gd name="connsiteY13" fmla="*/ 27432 h 27432"/>
+              <a:gd name="connsiteX14" fmla="*/ 733535 w 4243589"/>
+              <a:gd name="connsiteY14" fmla="*/ 27432 h 27432"/>
+              <a:gd name="connsiteX15" fmla="*/ 0 w 4243589"/>
+              <a:gd name="connsiteY15" fmla="*/ 27432 h 27432"/>
+              <a:gd name="connsiteX16" fmla="*/ 0 w 4243589"/>
+              <a:gd name="connsiteY16" fmla="*/ 0 h 27432"/>
+            </a:gdLst>
+            <a:ahLst/>
+            <a:cxnLst>
+              <a:cxn ang="0">
+                <a:pos x="connsiteX0" y="connsiteY0"/>
+              </a:cxn>
+              <a:cxn ang="0">
+                <a:pos x="connsiteX1" y="connsiteY1"/>
+              </a:cxn>
+              <a:cxn ang="0">
+                <a:pos x="connsiteX2" y="connsiteY2"/>
+              </a:cxn>
+              <a:cxn ang="0">
+                <a:pos x="connsiteX3" y="connsiteY3"/>
+              </a:cxn>
+              <a:cxn ang="0">
+                <a:pos x="connsiteX4" y="connsiteY4"/>
+              </a:cxn>
+              <a:cxn ang="0">
+                <a:pos x="connsiteX5" y="connsiteY5"/>
+              </a:cxn>
+              <a:cxn ang="0">
+                <a:pos x="connsiteX6" y="connsiteY6"/>
+              </a:cxn>
+              <a:cxn ang="0">
+                <a:pos x="connsiteX7" y="connsiteY7"/>
+              </a:cxn>
+              <a:cxn ang="0">
+                <a:pos x="connsiteX8" y="connsiteY8"/>
+              </a:cxn>
+              <a:cxn ang="0">
+                <a:pos x="connsiteX9" y="connsiteY9"/>
+              </a:cxn>
+              <a:cxn ang="0">
+                <a:pos x="connsiteX10" y="connsiteY10"/>
+              </a:cxn>
+              <a:cxn ang="0">
+                <a:pos x="connsiteX11" y="connsiteY11"/>
+              </a:cxn>
+              <a:cxn ang="0">
+                <a:pos x="connsiteX12" y="connsiteY12"/>
+              </a:cxn>
+              <a:cxn ang="0">
+                <a:pos x="connsiteX13" y="connsiteY13"/>
+              </a:cxn>
+              <a:cxn ang="0">
+                <a:pos x="connsiteX14" y="connsiteY14"/>
+              </a:cxn>
+              <a:cxn ang="0">
+                <a:pos x="connsiteX15" y="connsiteY15"/>
+              </a:cxn>
+              <a:cxn ang="0">
+                <a:pos x="connsiteX16" y="connsiteY16"/>
+              </a:cxn>
+            </a:cxnLst>
+            <a:rect l="l" t="t" r="r" b="b"/>
+            <a:pathLst>
+              <a:path w="4243589" h="27432" fill="none" extrusionOk="0">
+                <a:moveTo>
+                  <a:pt x="0" y="0"/>
+                </a:moveTo>
+                <a:cubicBezTo>
+                  <a:pt x="157351" y="-15653"/>
+                  <a:pt x="378877" y="-5828"/>
+                  <a:pt x="563791" y="0"/>
+                </a:cubicBezTo>
+                <a:cubicBezTo>
+                  <a:pt x="748705" y="5828"/>
+                  <a:pt x="905659" y="-5525"/>
+                  <a:pt x="1042710" y="0"/>
+                </a:cubicBezTo>
+                <a:cubicBezTo>
+                  <a:pt x="1179761" y="5525"/>
+                  <a:pt x="1356845" y="-21288"/>
+                  <a:pt x="1564066" y="0"/>
+                </a:cubicBezTo>
+                <a:cubicBezTo>
+                  <a:pt x="1771287" y="21288"/>
+                  <a:pt x="1912099" y="25135"/>
+                  <a:pt x="2212729" y="0"/>
+                </a:cubicBezTo>
+                <a:cubicBezTo>
+                  <a:pt x="2513359" y="-25135"/>
+                  <a:pt x="2514918" y="-27119"/>
+                  <a:pt x="2776520" y="0"/>
+                </a:cubicBezTo>
+                <a:cubicBezTo>
+                  <a:pt x="3038122" y="27119"/>
+                  <a:pt x="3178771" y="18116"/>
+                  <a:pt x="3297875" y="0"/>
+                </a:cubicBezTo>
+                <a:cubicBezTo>
+                  <a:pt x="3416980" y="-18116"/>
+                  <a:pt x="4012240" y="-40869"/>
+                  <a:pt x="4243589" y="0"/>
+                </a:cubicBezTo>
+                <a:cubicBezTo>
+                  <a:pt x="4242616" y="8304"/>
+                  <a:pt x="4243111" y="21512"/>
+                  <a:pt x="4243589" y="27432"/>
+                </a:cubicBezTo>
+                <a:cubicBezTo>
+                  <a:pt x="4112949" y="6289"/>
+                  <a:pt x="3928037" y="10975"/>
+                  <a:pt x="3637362" y="27432"/>
+                </a:cubicBezTo>
+                <a:cubicBezTo>
+                  <a:pt x="3346687" y="43889"/>
+                  <a:pt x="3254446" y="35813"/>
+                  <a:pt x="3116007" y="27432"/>
+                </a:cubicBezTo>
+                <a:cubicBezTo>
+                  <a:pt x="2977569" y="19051"/>
+                  <a:pt x="2620228" y="38017"/>
+                  <a:pt x="2424908" y="27432"/>
+                </a:cubicBezTo>
+                <a:cubicBezTo>
+                  <a:pt x="2229588" y="16847"/>
+                  <a:pt x="2088287" y="5290"/>
+                  <a:pt x="1861117" y="27432"/>
+                </a:cubicBezTo>
+                <a:cubicBezTo>
+                  <a:pt x="1633947" y="49574"/>
+                  <a:pt x="1502447" y="8273"/>
+                  <a:pt x="1382198" y="27432"/>
+                </a:cubicBezTo>
+                <a:cubicBezTo>
+                  <a:pt x="1261949" y="46591"/>
+                  <a:pt x="1045440" y="37497"/>
+                  <a:pt x="733535" y="27432"/>
+                </a:cubicBezTo>
+                <a:cubicBezTo>
+                  <a:pt x="421630" y="17367"/>
+                  <a:pt x="341257" y="-9215"/>
+                  <a:pt x="0" y="27432"/>
+                </a:cubicBezTo>
+                <a:cubicBezTo>
+                  <a:pt x="-1048" y="14992"/>
+                  <a:pt x="-1120" y="7447"/>
+                  <a:pt x="0" y="0"/>
+                </a:cubicBezTo>
+                <a:close/>
+              </a:path>
+              <a:path w="4243589" h="27432" stroke="0" extrusionOk="0">
+                <a:moveTo>
+                  <a:pt x="0" y="0"/>
+                </a:moveTo>
+                <a:cubicBezTo>
+                  <a:pt x="128164" y="17204"/>
+                  <a:pt x="312653" y="1129"/>
+                  <a:pt x="563791" y="0"/>
+                </a:cubicBezTo>
+                <a:cubicBezTo>
+                  <a:pt x="814929" y="-1129"/>
+                  <a:pt x="837271" y="8503"/>
+                  <a:pt x="1042710" y="0"/>
+                </a:cubicBezTo>
+                <a:cubicBezTo>
+                  <a:pt x="1248149" y="-8503"/>
+                  <a:pt x="1588432" y="-28862"/>
+                  <a:pt x="1733809" y="0"/>
+                </a:cubicBezTo>
+                <a:cubicBezTo>
+                  <a:pt x="1879186" y="28862"/>
+                  <a:pt x="2052815" y="5974"/>
+                  <a:pt x="2297600" y="0"/>
+                </a:cubicBezTo>
+                <a:cubicBezTo>
+                  <a:pt x="2542385" y="-5974"/>
+                  <a:pt x="2699960" y="-23550"/>
+                  <a:pt x="2861391" y="0"/>
+                </a:cubicBezTo>
+                <a:cubicBezTo>
+                  <a:pt x="3022822" y="23550"/>
+                  <a:pt x="3390411" y="25272"/>
+                  <a:pt x="3552490" y="0"/>
+                </a:cubicBezTo>
+                <a:cubicBezTo>
+                  <a:pt x="3714569" y="-25272"/>
+                  <a:pt x="3950585" y="-31327"/>
+                  <a:pt x="4243589" y="0"/>
+                </a:cubicBezTo>
+                <a:cubicBezTo>
+                  <a:pt x="4244074" y="9333"/>
+                  <a:pt x="4244867" y="19699"/>
+                  <a:pt x="4243589" y="27432"/>
+                </a:cubicBezTo>
+                <a:cubicBezTo>
+                  <a:pt x="4130424" y="7904"/>
+                  <a:pt x="3932803" y="51393"/>
+                  <a:pt x="3722234" y="27432"/>
+                </a:cubicBezTo>
+                <a:cubicBezTo>
+                  <a:pt x="3511665" y="3471"/>
+                  <a:pt x="3269903" y="55138"/>
+                  <a:pt x="3116007" y="27432"/>
+                </a:cubicBezTo>
+                <a:cubicBezTo>
+                  <a:pt x="2962111" y="-274"/>
+                  <a:pt x="2744280" y="32368"/>
+                  <a:pt x="2509780" y="27432"/>
+                </a:cubicBezTo>
+                <a:cubicBezTo>
+                  <a:pt x="2275280" y="22496"/>
+                  <a:pt x="2066059" y="52808"/>
+                  <a:pt x="1945989" y="27432"/>
+                </a:cubicBezTo>
+                <a:cubicBezTo>
+                  <a:pt x="1825919" y="2056"/>
+                  <a:pt x="1407329" y="21760"/>
+                  <a:pt x="1254890" y="27432"/>
+                </a:cubicBezTo>
+                <a:cubicBezTo>
+                  <a:pt x="1102451" y="33104"/>
+                  <a:pt x="837950" y="40817"/>
+                  <a:pt x="563791" y="27432"/>
+                </a:cubicBezTo>
+                <a:cubicBezTo>
+                  <a:pt x="289632" y="14047"/>
+                  <a:pt x="132768" y="16249"/>
+                  <a:pt x="0" y="27432"/>
+                </a:cubicBezTo>
+                <a:cubicBezTo>
+                  <a:pt x="211" y="18145"/>
+                  <a:pt x="120" y="6480"/>
+                  <a:pt x="0" y="0"/>
+                </a:cubicBezTo>
+                <a:close/>
+              </a:path>
+            </a:pathLst>
+          </a:custGeom>
+          <a:solidFill>
+            <a:schemeClr val="tx1"/>
+          </a:solidFill>
+          <a:ln w="38100" cap="rnd">
+            <a:solidFill>
+              <a:schemeClr val="tx1"/>
+            </a:solidFill>
+            <a:round/>
+            <a:extLst>
+              <a:ext uri="{C807C97D-BFC1-408E-A445-0C87EB9F89A2}">
+                <ask:lineSketchStyleProps xmlns:ask="http://schemas.microsoft.com/office/drawing/2018/sketchyshapes" sd="1219033472">
+                  <a:prstGeom prst="rect">
+                    <a:avLst/>
+                  </a:prstGeom>
+                  <ask:type>
+                    <ask:lineSketchFreehand/>
+                  </ask:type>
+                </ask:lineSketchStyleProps>
+              </a:ext>
+            </a:extLst>
+          </a:ln>
+        </p:spPr>
+        <p:style>
+          <a:lnRef idx="2">
+            <a:schemeClr val="accent1">
+              <a:shade val="50000"/>
+            </a:schemeClr>
+          </a:lnRef>
+          <a:fillRef idx="1">
+            <a:schemeClr val="accent1"/>
+          </a:fillRef>
+          <a:effectRef idx="0">
+            <a:schemeClr val="accent1"/>
+          </a:effectRef>
+          <a:fontRef idx="minor">
+            <a:schemeClr val="lt1"/>
+          </a:fontRef>
+        </p:style>
+        <p:txBody>
+          <a:bodyPr rtlCol="0" anchor="ctr"/>
+          <a:lstStyle/>
+          <a:p>
+            <a:pPr algn="ctr"/>
+            <a:endParaRPr lang="en-US">
+              <a:solidFill>
+                <a:schemeClr val="tx1"/>
+              </a:solidFill>
+            </a:endParaRPr>
+          </a:p>
+        </p:txBody>
+      </p:sp>
+      <p:sp useBgFill="1">
+        <p:nvSpPr>
+          <p:cNvPr id="17" name="Rectangle 16">
+            <a:extLst>
+              <a:ext uri="{FF2B5EF4-FFF2-40B4-BE49-F238E27FC236}">
+                <a16:creationId xmlns:a16="http://schemas.microsoft.com/office/drawing/2014/main" id="{D4F87819-B70D-4927-B657-7D175613F950}"/>
+              </a:ext>
+              <a:ext uri="{C183D7F6-B498-43B3-948B-1728B52AA6E4}">
+                <adec:decorative xmlns:adec="http://schemas.microsoft.com/office/drawing/2017/decorative" val="1"/>
+              </a:ext>
+            </a:extLst>
+          </p:cNvPr>
+          <p:cNvSpPr>
+            <a:spLocks noGrp="1" noRot="1" noChangeAspect="1" noMove="1" noResize="1" noEditPoints="1" noAdjustHandles="1" noChangeArrowheads="1" noChangeShapeType="1" noTextEdit="1"/>
+          </p:cNvSpPr>
+          <p:nvPr>
+            <p:extLst>
+              <p:ext uri="{386F3935-93C4-4BCD-93E2-E3B085C9AB24}">
+                <p16:designElem xmlns:p16="http://schemas.microsoft.com/office/powerpoint/2015/main" val="1"/>
+              </p:ext>
+            </p:extLst>
+          </p:nvPr>
+        </p:nvSpPr>
+        <p:spPr>
+          <a:xfrm>
+            <a:off x="0" y="0"/>
+            <a:ext cx="12188952" cy="6858000"/>
+          </a:xfrm>
+          <a:prstGeom prst="rect">
+            <a:avLst/>
+          </a:prstGeom>
+          <a:ln>
+            <a:noFill/>
+          </a:ln>
+        </p:spPr>
+        <p:style>
+          <a:lnRef idx="2">
+            <a:schemeClr val="accent1">
+              <a:shade val="50000"/>
+            </a:schemeClr>
+          </a:lnRef>
+          <a:fillRef idx="1">
+            <a:schemeClr val="accent1"/>
+          </a:fillRef>
+          <a:effectRef idx="0">
+            <a:schemeClr val="accent1"/>
+          </a:effectRef>
+          <a:fontRef idx="minor">
+            <a:schemeClr val="lt1"/>
+          </a:fontRef>
+        </p:style>
+        <p:txBody>
+          <a:bodyPr rtlCol="0" anchor="ctr"/>
+          <a:lstStyle/>
+          <a:p>
+            <a:pPr algn="ctr"/>
+            <a:endParaRPr lang="en-US"/>
+          </a:p>
+        </p:txBody>
+      </p:sp>
+      <p:sp>
+        <p:nvSpPr>
+          <p:cNvPr id="19" name="Freeform: Shape 18">
+            <a:extLst>
+              <a:ext uri="{FF2B5EF4-FFF2-40B4-BE49-F238E27FC236}">
+                <a16:creationId xmlns:a16="http://schemas.microsoft.com/office/drawing/2014/main" id="{DCB3820D-C773-4632-9F79-C890E1B2B50D}"/>
+              </a:ext>
+              <a:ext uri="{C183D7F6-B498-43B3-948B-1728B52AA6E4}">
+                <adec:decorative xmlns:adec="http://schemas.microsoft.com/office/drawing/2017/decorative" val="1"/>
+              </a:ext>
+            </a:extLst>
+          </p:cNvPr>
+          <p:cNvSpPr>
+            <a:spLocks noGrp="1" noRot="1" noChangeAspect="1" noMove="1" noResize="1" noEditPoints="1" noAdjustHandles="1" noChangeArrowheads="1" noChangeShapeType="1"/>
+          </p:cNvSpPr>
+          <p:nvPr>
+            <p:extLst>
+              <p:ext uri="{386F3935-93C4-4BCD-93E2-E3B085C9AB24}">
+                <p16:designElem xmlns:p16="http://schemas.microsoft.com/office/powerpoint/2015/main" val="1"/>
+              </p:ext>
+            </p:extLst>
+          </p:nvPr>
+        </p:nvSpPr>
+        <p:spPr>
+          <a:xfrm>
+            <a:off x="0" y="0"/>
+            <a:ext cx="12191999" cy="6177668"/>
+          </a:xfrm>
+          <a:custGeom>
+            <a:avLst/>
+            <a:gdLst>
+              <a:gd name="connsiteX0" fmla="*/ 6861986 w 12191999"/>
+              <a:gd name="connsiteY0" fmla="*/ 6107659 h 6177668"/>
+              <a:gd name="connsiteX1" fmla="*/ 6860986 w 12191999"/>
+              <a:gd name="connsiteY1" fmla="*/ 6107739 h 6177668"/>
+              <a:gd name="connsiteX2" fmla="*/ 6860759 w 12191999"/>
+              <a:gd name="connsiteY2" fmla="*/ 6108287 h 6177668"/>
+              <a:gd name="connsiteX3" fmla="*/ 0 w 12191999"/>
+              <a:gd name="connsiteY3" fmla="*/ 0 h 6177668"/>
+              <a:gd name="connsiteX4" fmla="*/ 12191999 w 12191999"/>
+              <a:gd name="connsiteY4" fmla="*/ 0 h 6177668"/>
+              <a:gd name="connsiteX5" fmla="*/ 12191999 w 12191999"/>
+              <a:gd name="connsiteY5" fmla="*/ 5215324 h 6177668"/>
+              <a:gd name="connsiteX6" fmla="*/ 12144282 w 12191999"/>
+              <a:gd name="connsiteY6" fmla="*/ 5229900 h 6177668"/>
+              <a:gd name="connsiteX7" fmla="*/ 11759192 w 12191999"/>
+              <a:gd name="connsiteY7" fmla="*/ 5336208 h 6177668"/>
+              <a:gd name="connsiteX8" fmla="*/ 10505159 w 12191999"/>
+              <a:gd name="connsiteY8" fmla="*/ 5627228 h 6177668"/>
+              <a:gd name="connsiteX9" fmla="*/ 9501755 w 12191999"/>
+              <a:gd name="connsiteY9" fmla="*/ 5807012 h 6177668"/>
+              <a:gd name="connsiteX10" fmla="*/ 8534155 w 12191999"/>
+              <a:gd name="connsiteY10" fmla="*/ 5944240 h 6177668"/>
+              <a:gd name="connsiteX11" fmla="*/ 7790171 w 12191999"/>
+              <a:gd name="connsiteY11" fmla="*/ 6026297 h 6177668"/>
+              <a:gd name="connsiteX12" fmla="*/ 7024337 w 12191999"/>
+              <a:gd name="connsiteY12" fmla="*/ 6093812 h 6177668"/>
+              <a:gd name="connsiteX13" fmla="*/ 7008892 w 12191999"/>
+              <a:gd name="connsiteY13" fmla="*/ 6095938 h 6177668"/>
+              <a:gd name="connsiteX14" fmla="*/ 6862735 w 12191999"/>
+              <a:gd name="connsiteY14" fmla="*/ 6107599 h 6177668"/>
+              <a:gd name="connsiteX15" fmla="*/ 6872248 w 12191999"/>
+              <a:gd name="connsiteY15" fmla="*/ 6109467 h 6177668"/>
+              <a:gd name="connsiteX16" fmla="*/ 6907812 w 12191999"/>
+              <a:gd name="connsiteY16" fmla="*/ 6107715 h 6177668"/>
+              <a:gd name="connsiteX17" fmla="*/ 6956484 w 12191999"/>
+              <a:gd name="connsiteY17" fmla="*/ 6104658 h 6177668"/>
+              <a:gd name="connsiteX18" fmla="*/ 7652688 w 12191999"/>
+              <a:gd name="connsiteY18" fmla="*/ 6071273 h 6177668"/>
+              <a:gd name="connsiteX19" fmla="*/ 8699923 w 12191999"/>
+              <a:gd name="connsiteY19" fmla="*/ 5982083 h 6177668"/>
+              <a:gd name="connsiteX20" fmla="*/ 9557819 w 12191999"/>
+              <a:gd name="connsiteY20" fmla="*/ 5875435 h 6177668"/>
+              <a:gd name="connsiteX21" fmla="*/ 10709534 w 12191999"/>
+              <a:gd name="connsiteY21" fmla="*/ 5676156 h 6177668"/>
+              <a:gd name="connsiteX22" fmla="*/ 12081554 w 12191999"/>
+              <a:gd name="connsiteY22" fmla="*/ 5341561 h 6177668"/>
+              <a:gd name="connsiteX23" fmla="*/ 12191999 w 12191999"/>
+              <a:gd name="connsiteY23" fmla="*/ 5308238 h 6177668"/>
+              <a:gd name="connsiteX24" fmla="*/ 12191999 w 12191999"/>
+              <a:gd name="connsiteY24" fmla="*/ 5364054 h 6177668"/>
+              <a:gd name="connsiteX25" fmla="*/ 11911964 w 12191999"/>
+              <a:gd name="connsiteY25" fmla="*/ 5447316 h 6177668"/>
+              <a:gd name="connsiteX26" fmla="*/ 11020049 w 12191999"/>
+              <a:gd name="connsiteY26" fmla="*/ 5667491 h 6177668"/>
+              <a:gd name="connsiteX27" fmla="*/ 10064425 w 12191999"/>
+              <a:gd name="connsiteY27" fmla="*/ 5852245 h 6177668"/>
+              <a:gd name="connsiteX28" fmla="*/ 9264124 w 12191999"/>
+              <a:gd name="connsiteY28" fmla="*/ 5971252 h 6177668"/>
+              <a:gd name="connsiteX29" fmla="*/ 8654182 w 12191999"/>
+              <a:gd name="connsiteY29" fmla="*/ 6042605 h 6177668"/>
+              <a:gd name="connsiteX30" fmla="*/ 7938866 w 12191999"/>
+              <a:gd name="connsiteY30" fmla="*/ 6105677 h 6177668"/>
+              <a:gd name="connsiteX31" fmla="*/ 7008089 w 12191999"/>
+              <a:gd name="connsiteY31" fmla="*/ 6158427 h 6177668"/>
+              <a:gd name="connsiteX32" fmla="*/ 6549390 w 12191999"/>
+              <a:gd name="connsiteY32" fmla="*/ 6172697 h 6177668"/>
+              <a:gd name="connsiteX33" fmla="*/ 6433696 w 12191999"/>
+              <a:gd name="connsiteY33" fmla="*/ 6177668 h 6177668"/>
+              <a:gd name="connsiteX34" fmla="*/ 6127899 w 12191999"/>
+              <a:gd name="connsiteY34" fmla="*/ 6177668 h 6177668"/>
+              <a:gd name="connsiteX35" fmla="*/ 6048391 w 12191999"/>
+              <a:gd name="connsiteY35" fmla="*/ 6172953 h 6177668"/>
+              <a:gd name="connsiteX36" fmla="*/ 5334221 w 12191999"/>
+              <a:gd name="connsiteY36" fmla="*/ 6135747 h 6177668"/>
+              <a:gd name="connsiteX37" fmla="*/ 4413510 w 12191999"/>
+              <a:gd name="connsiteY37" fmla="*/ 6072039 h 6177668"/>
+              <a:gd name="connsiteX38" fmla="*/ 3438265 w 12191999"/>
+              <a:gd name="connsiteY38" fmla="*/ 5970870 h 6177668"/>
+              <a:gd name="connsiteX39" fmla="*/ 2425303 w 12191999"/>
+              <a:gd name="connsiteY39" fmla="*/ 5848805 h 6177668"/>
+              <a:gd name="connsiteX40" fmla="*/ 1293973 w 12191999"/>
+              <a:gd name="connsiteY40" fmla="*/ 5671060 h 6177668"/>
+              <a:gd name="connsiteX41" fmla="*/ 126888 w 12191999"/>
+              <a:gd name="connsiteY41" fmla="*/ 5425029 h 6177668"/>
+              <a:gd name="connsiteX42" fmla="*/ 0 w 12191999"/>
+              <a:gd name="connsiteY42" fmla="*/ 5392100 h 6177668"/>
+              <a:gd name="connsiteX43" fmla="*/ 0 w 12191999"/>
+              <a:gd name="connsiteY43" fmla="*/ 5333771 h 6177668"/>
+              <a:gd name="connsiteX44" fmla="*/ 130837 w 12191999"/>
+              <a:gd name="connsiteY44" fmla="*/ 5368509 h 6177668"/>
+              <a:gd name="connsiteX45" fmla="*/ 660204 w 12191999"/>
+              <a:gd name="connsiteY45" fmla="*/ 5490001 h 6177668"/>
+              <a:gd name="connsiteX46" fmla="*/ 1831416 w 12191999"/>
+              <a:gd name="connsiteY46" fmla="*/ 5705715 h 6177668"/>
+              <a:gd name="connsiteX47" fmla="*/ 2677204 w 12191999"/>
+              <a:gd name="connsiteY47" fmla="*/ 5825742 h 6177668"/>
+              <a:gd name="connsiteX48" fmla="*/ 2644716 w 12191999"/>
+              <a:gd name="connsiteY48" fmla="*/ 5815549 h 6177668"/>
+              <a:gd name="connsiteX49" fmla="*/ 1173182 w 12191999"/>
+              <a:gd name="connsiteY49" fmla="*/ 5474074 h 6177668"/>
+              <a:gd name="connsiteX50" fmla="*/ 479527 w 12191999"/>
+              <a:gd name="connsiteY50" fmla="*/ 5269379 h 6177668"/>
+              <a:gd name="connsiteX51" fmla="*/ 0 w 12191999"/>
+              <a:gd name="connsiteY51" fmla="*/ 5107083 h 6177668"/>
+            </a:gdLst>
+            <a:ahLst/>
+            <a:cxnLst>
+              <a:cxn ang="0">
+                <a:pos x="connsiteX0" y="connsiteY0"/>
+              </a:cxn>
+              <a:cxn ang="0">
+                <a:pos x="connsiteX1" y="connsiteY1"/>
+              </a:cxn>
+              <a:cxn ang="0">
+                <a:pos x="connsiteX2" y="connsiteY2"/>
+              </a:cxn>
+              <a:cxn ang="0">
+                <a:pos x="connsiteX3" y="connsiteY3"/>
+              </a:cxn>
+              <a:cxn ang="0">
+                <a:pos x="connsiteX4" y="connsiteY4"/>
+              </a:cxn>
+              <a:cxn ang="0">
+                <a:pos x="connsiteX5" y="connsiteY5"/>
+              </a:cxn>
+              <a:cxn ang="0">
+                <a:pos x="connsiteX6" y="connsiteY6"/>
+              </a:cxn>
+              <a:cxn ang="0">
+                <a:pos x="connsiteX7" y="connsiteY7"/>
+              </a:cxn>
+              <a:cxn ang="0">
+                <a:pos x="connsiteX8" y="connsiteY8"/>
+              </a:cxn>
+              <a:cxn ang="0">
+                <a:pos x="connsiteX9" y="connsiteY9"/>
+              </a:cxn>
+              <a:cxn ang="0">
+                <a:pos x="connsiteX10" y="connsiteY10"/>
+              </a:cxn>
+              <a:cxn ang="0">
+                <a:pos x="connsiteX11" y="connsiteY11"/>
+              </a:cxn>
+              <a:cxn ang="0">
+                <a:pos x="connsiteX12" y="connsiteY12"/>
+              </a:cxn>
+              <a:cxn ang="0">
+                <a:pos x="connsiteX13" y="connsiteY13"/>
+              </a:cxn>
+              <a:cxn ang="0">
+                <a:pos x="connsiteX14" y="connsiteY14"/>
+              </a:cxn>
+              <a:cxn ang="0">
+                <a:pos x="connsiteX15" y="connsiteY15"/>
+              </a:cxn>
+              <a:cxn ang="0">
+                <a:pos x="connsiteX16" y="connsiteY16"/>
+              </a:cxn>
+              <a:cxn ang="0">
+                <a:pos x="connsiteX17" y="connsiteY17"/>
+              </a:cxn>
+              <a:cxn ang="0">
+                <a:pos x="connsiteX18" y="connsiteY18"/>
+              </a:cxn>
+              <a:cxn ang="0">
+                <a:pos x="connsiteX19" y="connsiteY19"/>
+              </a:cxn>
+              <a:cxn ang="0">
+                <a:pos x="connsiteX20" y="connsiteY20"/>
+              </a:cxn>
+              <a:cxn ang="0">
+                <a:pos x="connsiteX21" y="connsiteY21"/>
+              </a:cxn>
+              <a:cxn ang="0">
+                <a:pos x="connsiteX22" y="connsiteY22"/>
+              </a:cxn>
+              <a:cxn ang="0">
+                <a:pos x="connsiteX23" y="connsiteY23"/>
+              </a:cxn>
+              <a:cxn ang="0">
+                <a:pos x="connsiteX24" y="connsiteY24"/>
+              </a:cxn>
+              <a:cxn ang="0">
+                <a:pos x="connsiteX25" y="connsiteY25"/>
+              </a:cxn>
+              <a:cxn ang="0">
+                <a:pos x="connsiteX26" y="connsiteY26"/>
+              </a:cxn>
+              <a:cxn ang="0">
+                <a:pos x="connsiteX27" y="connsiteY27"/>
+              </a:cxn>
+              <a:cxn ang="0">
+                <a:pos x="connsiteX28" y="connsiteY28"/>
+              </a:cxn>
+              <a:cxn ang="0">
+                <a:pos x="connsiteX29" y="connsiteY29"/>
+              </a:cxn>
+              <a:cxn ang="0">
+                <a:pos x="connsiteX30" y="connsiteY30"/>
+              </a:cxn>
+              <a:cxn ang="0">
+                <a:pos x="connsiteX31" y="connsiteY31"/>
+              </a:cxn>
+              <a:cxn ang="0">
+                <a:pos x="connsiteX32" y="connsiteY32"/>
+              </a:cxn>
+              <a:cxn ang="0">
+                <a:pos x="connsiteX33" y="connsiteY33"/>
+              </a:cxn>
+              <a:cxn ang="0">
+                <a:pos x="connsiteX34" y="connsiteY34"/>
+              </a:cxn>
+              <a:cxn ang="0">
+                <a:pos x="connsiteX35" y="connsiteY35"/>
+              </a:cxn>
+              <a:cxn ang="0">
+                <a:pos x="connsiteX36" y="connsiteY36"/>
+              </a:cxn>
+              <a:cxn ang="0">
+                <a:pos x="connsiteX37" y="connsiteY37"/>
+              </a:cxn>
+              <a:cxn ang="0">
+                <a:pos x="connsiteX38" y="connsiteY38"/>
+              </a:cxn>
+              <a:cxn ang="0">
+                <a:pos x="connsiteX39" y="connsiteY39"/>
+              </a:cxn>
+              <a:cxn ang="0">
+                <a:pos x="connsiteX40" y="connsiteY40"/>
+              </a:cxn>
+              <a:cxn ang="0">
+                <a:pos x="connsiteX41" y="connsiteY41"/>
+              </a:cxn>
+              <a:cxn ang="0">
+                <a:pos x="connsiteX42" y="connsiteY42"/>
+              </a:cxn>
+              <a:cxn ang="0">
+                <a:pos x="connsiteX43" y="connsiteY43"/>
+              </a:cxn>
+              <a:cxn ang="0">
+                <a:pos x="connsiteX44" y="connsiteY44"/>
+              </a:cxn>
+              <a:cxn ang="0">
+                <a:pos x="connsiteX45" y="connsiteY45"/>
+              </a:cxn>
+              <a:cxn ang="0">
+                <a:pos x="connsiteX46" y="connsiteY46"/>
+              </a:cxn>
+              <a:cxn ang="0">
+                <a:pos x="connsiteX47" y="connsiteY47"/>
+              </a:cxn>
+              <a:cxn ang="0">
+                <a:pos x="connsiteX48" y="connsiteY48"/>
+              </a:cxn>
+              <a:cxn ang="0">
+                <a:pos x="connsiteX49" y="connsiteY49"/>
+              </a:cxn>
+              <a:cxn ang="0">
+                <a:pos x="connsiteX50" y="connsiteY50"/>
+              </a:cxn>
+              <a:cxn ang="0">
+                <a:pos x="connsiteX51" y="connsiteY51"/>
+              </a:cxn>
+            </a:cxnLst>
+            <a:rect l="l" t="t" r="r" b="b"/>
+            <a:pathLst>
+              <a:path w="12191999" h="6177668">
+                <a:moveTo>
+                  <a:pt x="6861986" y="6107659"/>
+                </a:moveTo>
+                <a:lnTo>
+                  <a:pt x="6860986" y="6107739"/>
+                </a:lnTo>
+                <a:lnTo>
+                  <a:pt x="6860759" y="6108287"/>
+                </a:lnTo>
+                <a:close/>
+                <a:moveTo>
+                  <a:pt x="0" y="0"/>
+                </a:moveTo>
+                <a:lnTo>
+                  <a:pt x="12191999" y="0"/>
+                </a:lnTo>
+                <a:lnTo>
+                  <a:pt x="12191999" y="5215324"/>
+                </a:lnTo>
+                <a:lnTo>
+                  <a:pt x="12144282" y="5229900"/>
+                </a:lnTo>
+                <a:cubicBezTo>
+                  <a:pt x="12016423" y="5267070"/>
+                  <a:pt x="11888048" y="5302510"/>
+                  <a:pt x="11759192" y="5336208"/>
+                </a:cubicBezTo>
+                <a:cubicBezTo>
+                  <a:pt x="11344324" y="5446552"/>
+                  <a:pt x="10926015" y="5542623"/>
+                  <a:pt x="10505159" y="5627228"/>
+                </a:cubicBezTo>
+                <a:cubicBezTo>
+                  <a:pt x="10171926" y="5694160"/>
+                  <a:pt x="9837459" y="5754097"/>
+                  <a:pt x="9501755" y="5807012"/>
+                </a:cubicBezTo>
+                <a:cubicBezTo>
+                  <a:pt x="9180066" y="5857979"/>
+                  <a:pt x="8857537" y="5903722"/>
+                  <a:pt x="8534155" y="5944240"/>
+                </a:cubicBezTo>
+                <a:cubicBezTo>
+                  <a:pt x="8286585" y="5975202"/>
+                  <a:pt x="8038506" y="6001450"/>
+                  <a:pt x="7790171" y="6026297"/>
+                </a:cubicBezTo>
+                <a:lnTo>
+                  <a:pt x="7024337" y="6093812"/>
+                </a:lnTo>
+                <a:lnTo>
+                  <a:pt x="7008892" y="6095938"/>
+                </a:lnTo>
+                <a:lnTo>
+                  <a:pt x="6862735" y="6107599"/>
+                </a:lnTo>
+                <a:lnTo>
+                  <a:pt x="6872248" y="6109467"/>
+                </a:lnTo>
+                <a:cubicBezTo>
+                  <a:pt x="6883954" y="6109945"/>
+                  <a:pt x="6896090" y="6107715"/>
+                  <a:pt x="6907812" y="6107715"/>
+                </a:cubicBezTo>
+                <a:cubicBezTo>
+                  <a:pt x="6923994" y="6107715"/>
+                  <a:pt x="6940176" y="6105039"/>
+                  <a:pt x="6956484" y="6104658"/>
+                </a:cubicBezTo>
+                <a:cubicBezTo>
+                  <a:pt x="7188765" y="6099052"/>
+                  <a:pt x="7420790" y="6086564"/>
+                  <a:pt x="7652688" y="6071273"/>
+                </a:cubicBezTo>
+                <a:cubicBezTo>
+                  <a:pt x="8002191" y="6048212"/>
+                  <a:pt x="8351439" y="6019289"/>
+                  <a:pt x="8699923" y="5982083"/>
+                </a:cubicBezTo>
+                <a:cubicBezTo>
+                  <a:pt x="8986610" y="5952012"/>
+                  <a:pt x="9272570" y="5916463"/>
+                  <a:pt x="9557819" y="5875435"/>
+                </a:cubicBezTo>
+                <a:cubicBezTo>
+                  <a:pt x="9943546" y="5819627"/>
+                  <a:pt x="10327451" y="5753205"/>
+                  <a:pt x="10709534" y="5676156"/>
+                </a:cubicBezTo>
+                <a:cubicBezTo>
+                  <a:pt x="11171292" y="5582632"/>
+                  <a:pt x="11629098" y="5472289"/>
+                  <a:pt x="12081554" y="5341561"/>
+                </a:cubicBezTo>
+                <a:lnTo>
+                  <a:pt x="12191999" y="5308238"/>
+                </a:lnTo>
+                <a:lnTo>
+                  <a:pt x="12191999" y="5364054"/>
+                </a:lnTo>
+                <a:lnTo>
+                  <a:pt x="11911964" y="5447316"/>
+                </a:lnTo>
+                <a:cubicBezTo>
+                  <a:pt x="11616866" y="5529116"/>
+                  <a:pt x="11319604" y="5601872"/>
+                  <a:pt x="11020049" y="5667491"/>
+                </a:cubicBezTo>
+                <a:cubicBezTo>
+                  <a:pt x="10703036" y="5737061"/>
+                  <a:pt x="10384496" y="5798641"/>
+                  <a:pt x="10064425" y="5852245"/>
+                </a:cubicBezTo>
+                <a:cubicBezTo>
+                  <a:pt x="9798381" y="5896841"/>
+                  <a:pt x="9531609" y="5936505"/>
+                  <a:pt x="9264124" y="5971252"/>
+                </a:cubicBezTo>
+                <a:cubicBezTo>
+                  <a:pt x="9061021" y="5997500"/>
+                  <a:pt x="8857919" y="6022219"/>
+                  <a:pt x="8654182" y="6042605"/>
+                </a:cubicBezTo>
+                <a:cubicBezTo>
+                  <a:pt x="8416040" y="6065924"/>
+                  <a:pt x="8177644" y="6087966"/>
+                  <a:pt x="7938866" y="6105677"/>
+                </a:cubicBezTo>
+                <a:cubicBezTo>
+                  <a:pt x="7628862" y="6128611"/>
+                  <a:pt x="7318730" y="6146960"/>
+                  <a:pt x="7008089" y="6158427"/>
+                </a:cubicBezTo>
+                <a:cubicBezTo>
+                  <a:pt x="6855189" y="6164034"/>
+                  <a:pt x="6702290" y="6167984"/>
+                  <a:pt x="6549390" y="6172697"/>
+                </a:cubicBezTo>
+                <a:cubicBezTo>
+                  <a:pt x="6510756" y="6170558"/>
+                  <a:pt x="6472010" y="6172226"/>
+                  <a:pt x="6433696" y="6177668"/>
+                </a:cubicBezTo>
+                <a:lnTo>
+                  <a:pt x="6127899" y="6177668"/>
+                </a:lnTo>
+                <a:lnTo>
+                  <a:pt x="6048391" y="6172953"/>
+                </a:lnTo>
+                <a:cubicBezTo>
+                  <a:pt x="5810377" y="6160212"/>
+                  <a:pt x="5572363" y="6146069"/>
+                  <a:pt x="5334221" y="6135747"/>
+                </a:cubicBezTo>
+                <a:cubicBezTo>
+                  <a:pt x="5026766" y="6123004"/>
+                  <a:pt x="4719692" y="6101983"/>
+                  <a:pt x="4413510" y="6072039"/>
+                </a:cubicBezTo>
+                <a:cubicBezTo>
+                  <a:pt x="4088215" y="6040312"/>
+                  <a:pt x="3763687" y="6004763"/>
+                  <a:pt x="3438265" y="5970870"/>
+                </a:cubicBezTo>
+                <a:cubicBezTo>
+                  <a:pt x="3099935" y="5935704"/>
+                  <a:pt x="2762281" y="5895019"/>
+                  <a:pt x="2425303" y="5848805"/>
+                </a:cubicBezTo>
+                <a:cubicBezTo>
+                  <a:pt x="2047042" y="5797329"/>
+                  <a:pt x="1669936" y="5738080"/>
+                  <a:pt x="1293973" y="5671060"/>
+                </a:cubicBezTo>
+                <a:cubicBezTo>
+                  <a:pt x="902168" y="5600534"/>
+                  <a:pt x="512942" y="5519976"/>
+                  <a:pt x="126888" y="5425029"/>
+                </a:cubicBezTo>
+                <a:lnTo>
+                  <a:pt x="0" y="5392100"/>
+                </a:lnTo>
+                <a:lnTo>
+                  <a:pt x="0" y="5333771"/>
+                </a:lnTo>
+                <a:lnTo>
+                  <a:pt x="130837" y="5368509"/>
+                </a:lnTo>
+                <a:cubicBezTo>
+                  <a:pt x="306720" y="5411799"/>
+                  <a:pt x="483287" y="5452095"/>
+                  <a:pt x="660204" y="5490001"/>
+                </a:cubicBezTo>
+                <a:cubicBezTo>
+                  <a:pt x="1048569" y="5572948"/>
+                  <a:pt x="1439228" y="5643664"/>
+                  <a:pt x="1831416" y="5705715"/>
+                </a:cubicBezTo>
+                <a:cubicBezTo>
+                  <a:pt x="2114917" y="5750440"/>
+                  <a:pt x="2398801" y="5791595"/>
+                  <a:pt x="2677204" y="5825742"/>
+                </a:cubicBezTo>
+                <a:cubicBezTo>
+                  <a:pt x="2669177" y="5828418"/>
+                  <a:pt x="2658222" y="5818097"/>
+                  <a:pt x="2644716" y="5815549"/>
+                </a:cubicBezTo>
+                <a:cubicBezTo>
+                  <a:pt x="2149740" y="5721171"/>
+                  <a:pt x="1659233" y="5607352"/>
+                  <a:pt x="1173182" y="5474074"/>
+                </a:cubicBezTo>
+                <a:cubicBezTo>
+                  <a:pt x="940520" y="5410366"/>
+                  <a:pt x="709302" y="5342134"/>
+                  <a:pt x="479527" y="5269379"/>
+                </a:cubicBezTo>
+                <a:lnTo>
+                  <a:pt x="0" y="5107083"/>
+                </a:lnTo>
+                <a:close/>
+              </a:path>
+            </a:pathLst>
+          </a:custGeom>
+          <a:solidFill>
+            <a:schemeClr val="tx1"/>
+          </a:solidFill>
+          <a:ln>
+            <a:noFill/>
+          </a:ln>
+        </p:spPr>
+        <p:style>
+          <a:lnRef idx="2">
+            <a:schemeClr val="accent1">
+              <a:shade val="50000"/>
+            </a:schemeClr>
+          </a:lnRef>
+          <a:fillRef idx="1">
+            <a:schemeClr val="accent1"/>
+          </a:fillRef>
+          <a:effectRef idx="0">
+            <a:schemeClr val="accent1"/>
+          </a:effectRef>
+          <a:fontRef idx="minor">
+            <a:schemeClr val="lt1"/>
+          </a:fontRef>
+        </p:style>
+        <p:txBody>
+          <a:bodyPr wrap="square" rtlCol="0" anchor="ctr">
+            <a:noAutofit/>
+          </a:bodyPr>
+          <a:lstStyle/>
+          <a:p>
+            <a:pPr algn="ctr"/>
+            <a:endParaRPr lang="en-US"/>
+          </a:p>
+        </p:txBody>
+      </p:sp>
+      <p:pic>
+        <p:nvPicPr>
+          <p:cNvPr id="10" name="Picture 9" descr="A picture containing coelenterate&#10;&#10;Description automatically generated">
+            <a:extLst>
+              <a:ext uri="{FF2B5EF4-FFF2-40B4-BE49-F238E27FC236}">
+                <a16:creationId xmlns:a16="http://schemas.microsoft.com/office/drawing/2014/main" id="{D494A391-E97A-F7C6-B079-19815A2FB16C}"/>
+              </a:ext>
+            </a:extLst>
+          </p:cNvPr>
+          <p:cNvPicPr>
+            <a:picLocks noChangeAspect="1"/>
+          </p:cNvPicPr>
+          <p:nvPr/>
+        </p:nvPicPr>
+        <p:blipFill rotWithShape="1">
+          <a:blip r:embed="rId2">
+            <a:alphaModFix amt="55000"/>
+            <a:extLst>
+              <a:ext uri="{28A0092B-C50C-407E-A947-70E740481C1C}">
+                <a14:useLocalDpi xmlns:a14="http://schemas.microsoft.com/office/drawing/2010/main" val="0"/>
+              </a:ext>
+            </a:extLst>
+          </a:blip>
+          <a:srcRect t="4466" b="19624"/>
+          <a:stretch/>
+        </p:blipFill>
+        <p:spPr>
+          <a:xfrm>
+            <a:off x="20" y="10"/>
+            <a:ext cx="12191979" cy="6177658"/>
+          </a:xfrm>
+          <a:custGeom>
+            <a:avLst/>
+            <a:gdLst/>
+            <a:ahLst/>
+            <a:cxnLst/>
+            <a:rect l="l" t="t" r="r" b="b"/>
+            <a:pathLst>
+              <a:path w="12191999" h="6177668">
+                <a:moveTo>
+                  <a:pt x="6861986" y="6107659"/>
+                </a:moveTo>
+                <a:lnTo>
+                  <a:pt x="6860986" y="6107739"/>
+                </a:lnTo>
+                <a:lnTo>
+                  <a:pt x="6860759" y="6108287"/>
+                </a:lnTo>
+                <a:close/>
+                <a:moveTo>
+                  <a:pt x="0" y="0"/>
+                </a:moveTo>
+                <a:lnTo>
+                  <a:pt x="12191999" y="0"/>
+                </a:lnTo>
+                <a:lnTo>
+                  <a:pt x="12191999" y="5215324"/>
+                </a:lnTo>
+                <a:lnTo>
+                  <a:pt x="12144282" y="5229900"/>
+                </a:lnTo>
+                <a:cubicBezTo>
+                  <a:pt x="12016423" y="5267070"/>
+                  <a:pt x="11888048" y="5302510"/>
+                  <a:pt x="11759192" y="5336208"/>
+                </a:cubicBezTo>
+                <a:cubicBezTo>
+                  <a:pt x="11344324" y="5446552"/>
+                  <a:pt x="10926015" y="5542623"/>
+                  <a:pt x="10505159" y="5627228"/>
+                </a:cubicBezTo>
+                <a:cubicBezTo>
+                  <a:pt x="10171926" y="5694160"/>
+                  <a:pt x="9837459" y="5754097"/>
+                  <a:pt x="9501755" y="5807012"/>
+                </a:cubicBezTo>
+                <a:cubicBezTo>
+                  <a:pt x="9180066" y="5857979"/>
+                  <a:pt x="8857537" y="5903722"/>
+                  <a:pt x="8534155" y="5944240"/>
+                </a:cubicBezTo>
+                <a:cubicBezTo>
+                  <a:pt x="8286585" y="5975202"/>
+                  <a:pt x="8038506" y="6001450"/>
+                  <a:pt x="7790171" y="6026297"/>
+                </a:cubicBezTo>
+                <a:lnTo>
+                  <a:pt x="7024337" y="6093812"/>
+                </a:lnTo>
+                <a:lnTo>
+                  <a:pt x="7008892" y="6095938"/>
+                </a:lnTo>
+                <a:lnTo>
+                  <a:pt x="6862735" y="6107599"/>
+                </a:lnTo>
+                <a:lnTo>
+                  <a:pt x="6872248" y="6109467"/>
+                </a:lnTo>
+                <a:cubicBezTo>
+                  <a:pt x="6883954" y="6109945"/>
+                  <a:pt x="6896090" y="6107715"/>
+                  <a:pt x="6907812" y="6107715"/>
+                </a:cubicBezTo>
+                <a:cubicBezTo>
+                  <a:pt x="6923994" y="6107715"/>
+                  <a:pt x="6940176" y="6105039"/>
+                  <a:pt x="6956484" y="6104658"/>
+                </a:cubicBezTo>
+                <a:cubicBezTo>
+                  <a:pt x="7188765" y="6099052"/>
+                  <a:pt x="7420790" y="6086564"/>
+                  <a:pt x="7652688" y="6071273"/>
+                </a:cubicBezTo>
+                <a:cubicBezTo>
+                  <a:pt x="8002191" y="6048212"/>
+                  <a:pt x="8351439" y="6019289"/>
+                  <a:pt x="8699923" y="5982083"/>
+                </a:cubicBezTo>
+                <a:cubicBezTo>
+                  <a:pt x="8986610" y="5952012"/>
+                  <a:pt x="9272570" y="5916463"/>
+                  <a:pt x="9557819" y="5875435"/>
+                </a:cubicBezTo>
+                <a:cubicBezTo>
+                  <a:pt x="9943546" y="5819627"/>
+                  <a:pt x="10327451" y="5753205"/>
+                  <a:pt x="10709534" y="5676156"/>
+                </a:cubicBezTo>
+                <a:cubicBezTo>
+                  <a:pt x="11171292" y="5582632"/>
+                  <a:pt x="11629098" y="5472289"/>
+                  <a:pt x="12081554" y="5341561"/>
+                </a:cubicBezTo>
+                <a:lnTo>
+                  <a:pt x="12191999" y="5308238"/>
+                </a:lnTo>
+                <a:lnTo>
+                  <a:pt x="12191999" y="5364054"/>
+                </a:lnTo>
+                <a:lnTo>
+                  <a:pt x="11911964" y="5447316"/>
+                </a:lnTo>
+                <a:cubicBezTo>
+                  <a:pt x="11616866" y="5529116"/>
+                  <a:pt x="11319604" y="5601872"/>
+                  <a:pt x="11020049" y="5667491"/>
+                </a:cubicBezTo>
+                <a:cubicBezTo>
+                  <a:pt x="10703036" y="5737061"/>
+                  <a:pt x="10384496" y="5798641"/>
+                  <a:pt x="10064425" y="5852245"/>
+                </a:cubicBezTo>
+                <a:cubicBezTo>
+                  <a:pt x="9798381" y="5896841"/>
+                  <a:pt x="9531609" y="5936505"/>
+                  <a:pt x="9264124" y="5971252"/>
+                </a:cubicBezTo>
+                <a:cubicBezTo>
+                  <a:pt x="9061021" y="5997500"/>
+                  <a:pt x="8857919" y="6022219"/>
+                  <a:pt x="8654182" y="6042605"/>
+                </a:cubicBezTo>
+                <a:cubicBezTo>
+                  <a:pt x="8416040" y="6065924"/>
+                  <a:pt x="8177644" y="6087966"/>
+                  <a:pt x="7938866" y="6105677"/>
+                </a:cubicBezTo>
+                <a:cubicBezTo>
+                  <a:pt x="7628862" y="6128611"/>
+                  <a:pt x="7318730" y="6146960"/>
+                  <a:pt x="7008089" y="6158427"/>
+                </a:cubicBezTo>
+                <a:cubicBezTo>
+                  <a:pt x="6855189" y="6164034"/>
+                  <a:pt x="6702290" y="6167984"/>
+                  <a:pt x="6549390" y="6172697"/>
+                </a:cubicBezTo>
+                <a:cubicBezTo>
+                  <a:pt x="6510756" y="6170558"/>
+                  <a:pt x="6472010" y="6172226"/>
+                  <a:pt x="6433696" y="6177668"/>
+                </a:cubicBezTo>
+                <a:lnTo>
+                  <a:pt x="6127899" y="6177668"/>
+                </a:lnTo>
+                <a:lnTo>
+                  <a:pt x="6048391" y="6172953"/>
+                </a:lnTo>
+                <a:cubicBezTo>
+                  <a:pt x="5810377" y="6160212"/>
+                  <a:pt x="5572363" y="6146069"/>
+                  <a:pt x="5334221" y="6135747"/>
+                </a:cubicBezTo>
+                <a:cubicBezTo>
+                  <a:pt x="5026766" y="6123004"/>
+                  <a:pt x="4719692" y="6101983"/>
+                  <a:pt x="4413510" y="6072039"/>
+                </a:cubicBezTo>
+                <a:cubicBezTo>
+                  <a:pt x="4088215" y="6040312"/>
+                  <a:pt x="3763687" y="6004763"/>
+                  <a:pt x="3438265" y="5970870"/>
+                </a:cubicBezTo>
+                <a:cubicBezTo>
+                  <a:pt x="3099935" y="5935704"/>
+                  <a:pt x="2762281" y="5895019"/>
+                  <a:pt x="2425303" y="5848805"/>
+                </a:cubicBezTo>
+                <a:cubicBezTo>
+                  <a:pt x="2047042" y="5797329"/>
+                  <a:pt x="1669936" y="5738080"/>
+                  <a:pt x="1293973" y="5671060"/>
+                </a:cubicBezTo>
+                <a:cubicBezTo>
+                  <a:pt x="902168" y="5600534"/>
+                  <a:pt x="512942" y="5519976"/>
+                  <a:pt x="126888" y="5425029"/>
+                </a:cubicBezTo>
+                <a:lnTo>
+                  <a:pt x="0" y="5392100"/>
+                </a:lnTo>
+                <a:lnTo>
+                  <a:pt x="0" y="5333771"/>
+                </a:lnTo>
+                <a:lnTo>
+                  <a:pt x="130837" y="5368509"/>
+                </a:lnTo>
+                <a:cubicBezTo>
+                  <a:pt x="306720" y="5411799"/>
+                  <a:pt x="483287" y="5452095"/>
+                  <a:pt x="660204" y="5490001"/>
+                </a:cubicBezTo>
+                <a:cubicBezTo>
+                  <a:pt x="1048569" y="5572948"/>
+                  <a:pt x="1439228" y="5643664"/>
+                  <a:pt x="1831416" y="5705715"/>
+                </a:cubicBezTo>
+                <a:cubicBezTo>
+                  <a:pt x="2114917" y="5750440"/>
+                  <a:pt x="2398801" y="5791595"/>
+                  <a:pt x="2677204" y="5825742"/>
+                </a:cubicBezTo>
+                <a:cubicBezTo>
+                  <a:pt x="2669177" y="5828418"/>
+                  <a:pt x="2658222" y="5818097"/>
+                  <a:pt x="2644716" y="5815549"/>
+                </a:cubicBezTo>
+                <a:cubicBezTo>
+                  <a:pt x="2149740" y="5721171"/>
+                  <a:pt x="1659233" y="5607352"/>
+                  <a:pt x="1173182" y="5474074"/>
+                </a:cubicBezTo>
+                <a:cubicBezTo>
+                  <a:pt x="940520" y="5410366"/>
+                  <a:pt x="709302" y="5342134"/>
+                  <a:pt x="479527" y="5269379"/>
+                </a:cubicBezTo>
+                <a:lnTo>
+                  <a:pt x="0" y="5107083"/>
+                </a:lnTo>
+                <a:close/>
+              </a:path>
+            </a:pathLst>
+          </a:custGeom>
+        </p:spPr>
+      </p:pic>
+      <p:sp>
+        <p:nvSpPr>
+          <p:cNvPr id="8" name="Title 7">
+            <a:extLst>
+              <a:ext uri="{FF2B5EF4-FFF2-40B4-BE49-F238E27FC236}">
+                <a16:creationId xmlns:a16="http://schemas.microsoft.com/office/drawing/2014/main" id="{04DB0DA4-47D1-8C6B-D412-DED8CD9AB258}"/>
+              </a:ext>
+            </a:extLst>
+          </p:cNvPr>
+          <p:cNvSpPr>
+            <a:spLocks noGrp="1"/>
+          </p:cNvSpPr>
+          <p:nvPr>
+            <p:ph type="title"/>
+          </p:nvPr>
+        </p:nvSpPr>
+        <p:spPr>
+          <a:xfrm>
+            <a:off x="600635" y="511526"/>
+            <a:ext cx="11394141" cy="3907535"/>
+          </a:xfrm>
+        </p:spPr>
+        <p:txBody>
+          <a:bodyPr vert="horz" lIns="91440" tIns="45720" rIns="91440" bIns="45720" rtlCol="0" anchor="b">
+            <a:normAutofit/>
+            <a:scene3d>
+              <a:camera prst="orthographicFront"/>
+              <a:lightRig rig="threePt" dir="t"/>
+            </a:scene3d>
+            <a:sp3d extrusionH="57150">
+              <a:bevelT w="38100" h="38100" prst="slope"/>
+            </a:sp3d>
+          </a:bodyPr>
+          <a:lstStyle/>
+          <a:p>
+            <a:pPr>
+              <a:lnSpc>
+                <a:spcPct val="90000"/>
+              </a:lnSpc>
+            </a:pPr>
+            <a:r>
+              <a:rPr lang="en-US" sz="8000" b="1" dirty="0">
+                <a:solidFill>
+                  <a:schemeClr val="tx1">
+                    <a:lumMod val="85000"/>
+                    <a:lumOff val="15000"/>
+                  </a:schemeClr>
+                </a:solidFill>
+                <a:effectLst>
+                  <a:glow rad="101600">
+                    <a:schemeClr val="bg1">
+                      <a:alpha val="60000"/>
+                    </a:schemeClr>
+                  </a:glow>
+                  <a:outerShdw blurRad="50800" dist="38100" dir="2700000" algn="tl" rotWithShape="0">
+                    <a:schemeClr val="bg1">
+                      <a:alpha val="40000"/>
+                    </a:schemeClr>
+                  </a:outerShdw>
+                </a:effectLst>
+                <a:latin typeface="Century Gothic" panose="020B0502020202020204" pitchFamily="34" charset="0"/>
+              </a:rPr>
+              <a:t>Always setup Entity Framework like this for EF Bundle 🤔</a:t>
+            </a:r>
+          </a:p>
+        </p:txBody>
+      </p:sp>
+      <p:sp>
+        <p:nvSpPr>
+          <p:cNvPr id="21" name="Rectangle 6">
+            <a:extLst>
+              <a:ext uri="{FF2B5EF4-FFF2-40B4-BE49-F238E27FC236}">
+                <a16:creationId xmlns:a16="http://schemas.microsoft.com/office/drawing/2014/main" id="{DCB8EB4B-AFE9-41E8-95B0-F246E5740491}"/>
+              </a:ext>
+              <a:ext uri="{C183D7F6-B498-43B3-948B-1728B52AA6E4}">
+                <adec:decorative xmlns:adec="http://schemas.microsoft.com/office/drawing/2017/decorative" val="1"/>
+              </a:ext>
+            </a:extLst>
+          </p:cNvPr>
+          <p:cNvSpPr>
+            <a:spLocks noChangeAspect="1"/>
+          </p:cNvSpPr>
+          <p:nvPr>
+            <p:extLst>
+              <p:ext uri="{386F3935-93C4-4BCD-93E2-E3B085C9AB24}">
+                <p16:designElem xmlns:p16="http://schemas.microsoft.com/office/powerpoint/2015/main" val="1"/>
+              </p:ext>
+            </p:extLst>
+          </p:nvPr>
+        </p:nvSpPr>
+        <p:spPr>
+          <a:xfrm>
+            <a:off x="2559753" y="4766277"/>
+            <a:ext cx="7072494" cy="45719"/>
+          </a:xfrm>
+          <a:custGeom>
+            <a:avLst/>
+            <a:gdLst>
+              <a:gd name="connsiteX0" fmla="*/ 0 w 7072494"/>
+              <a:gd name="connsiteY0" fmla="*/ 0 h 45719"/>
+              <a:gd name="connsiteX1" fmla="*/ 430779 w 7072494"/>
+              <a:gd name="connsiteY1" fmla="*/ 0 h 45719"/>
+              <a:gd name="connsiteX2" fmla="*/ 1215183 w 7072494"/>
+              <a:gd name="connsiteY2" fmla="*/ 0 h 45719"/>
+              <a:gd name="connsiteX3" fmla="*/ 1928862 w 7072494"/>
+              <a:gd name="connsiteY3" fmla="*/ 0 h 45719"/>
+              <a:gd name="connsiteX4" fmla="*/ 2359641 w 7072494"/>
+              <a:gd name="connsiteY4" fmla="*/ 0 h 45719"/>
+              <a:gd name="connsiteX5" fmla="*/ 2931870 w 7072494"/>
+              <a:gd name="connsiteY5" fmla="*/ 0 h 45719"/>
+              <a:gd name="connsiteX6" fmla="*/ 3716274 w 7072494"/>
+              <a:gd name="connsiteY6" fmla="*/ 0 h 45719"/>
+              <a:gd name="connsiteX7" fmla="*/ 4359228 w 7072494"/>
+              <a:gd name="connsiteY7" fmla="*/ 0 h 45719"/>
+              <a:gd name="connsiteX8" fmla="*/ 5072907 w 7072494"/>
+              <a:gd name="connsiteY8" fmla="*/ 0 h 45719"/>
+              <a:gd name="connsiteX9" fmla="*/ 5645136 w 7072494"/>
+              <a:gd name="connsiteY9" fmla="*/ 0 h 45719"/>
+              <a:gd name="connsiteX10" fmla="*/ 6288090 w 7072494"/>
+              <a:gd name="connsiteY10" fmla="*/ 0 h 45719"/>
+              <a:gd name="connsiteX11" fmla="*/ 7072494 w 7072494"/>
+              <a:gd name="connsiteY11" fmla="*/ 0 h 45719"/>
+              <a:gd name="connsiteX12" fmla="*/ 7072494 w 7072494"/>
+              <a:gd name="connsiteY12" fmla="*/ 45719 h 45719"/>
+              <a:gd name="connsiteX13" fmla="*/ 6641715 w 7072494"/>
+              <a:gd name="connsiteY13" fmla="*/ 45719 h 45719"/>
+              <a:gd name="connsiteX14" fmla="*/ 6210936 w 7072494"/>
+              <a:gd name="connsiteY14" fmla="*/ 45719 h 45719"/>
+              <a:gd name="connsiteX15" fmla="*/ 5497257 w 7072494"/>
+              <a:gd name="connsiteY15" fmla="*/ 45719 h 45719"/>
+              <a:gd name="connsiteX16" fmla="*/ 5066478 w 7072494"/>
+              <a:gd name="connsiteY16" fmla="*/ 45719 h 45719"/>
+              <a:gd name="connsiteX17" fmla="*/ 4423524 w 7072494"/>
+              <a:gd name="connsiteY17" fmla="*/ 45719 h 45719"/>
+              <a:gd name="connsiteX18" fmla="*/ 3922019 w 7072494"/>
+              <a:gd name="connsiteY18" fmla="*/ 45719 h 45719"/>
+              <a:gd name="connsiteX19" fmla="*/ 3279065 w 7072494"/>
+              <a:gd name="connsiteY19" fmla="*/ 45719 h 45719"/>
+              <a:gd name="connsiteX20" fmla="*/ 2636111 w 7072494"/>
+              <a:gd name="connsiteY20" fmla="*/ 45719 h 45719"/>
+              <a:gd name="connsiteX21" fmla="*/ 1993157 w 7072494"/>
+              <a:gd name="connsiteY21" fmla="*/ 45719 h 45719"/>
+              <a:gd name="connsiteX22" fmla="*/ 1350203 w 7072494"/>
+              <a:gd name="connsiteY22" fmla="*/ 45719 h 45719"/>
+              <a:gd name="connsiteX23" fmla="*/ 777974 w 7072494"/>
+              <a:gd name="connsiteY23" fmla="*/ 45719 h 45719"/>
+              <a:gd name="connsiteX24" fmla="*/ 0 w 7072494"/>
+              <a:gd name="connsiteY24" fmla="*/ 45719 h 45719"/>
+              <a:gd name="connsiteX25" fmla="*/ 0 w 7072494"/>
+              <a:gd name="connsiteY25" fmla="*/ 0 h 45719"/>
+            </a:gdLst>
+            <a:ahLst/>
+            <a:cxnLst>
+              <a:cxn ang="0">
+                <a:pos x="connsiteX0" y="connsiteY0"/>
+              </a:cxn>
+              <a:cxn ang="0">
+                <a:pos x="connsiteX1" y="connsiteY1"/>
+              </a:cxn>
+              <a:cxn ang="0">
+                <a:pos x="connsiteX2" y="connsiteY2"/>
+              </a:cxn>
+              <a:cxn ang="0">
+                <a:pos x="connsiteX3" y="connsiteY3"/>
+              </a:cxn>
+              <a:cxn ang="0">
+                <a:pos x="connsiteX4" y="connsiteY4"/>
+              </a:cxn>
+              <a:cxn ang="0">
+                <a:pos x="connsiteX5" y="connsiteY5"/>
+              </a:cxn>
+              <a:cxn ang="0">
+                <a:pos x="connsiteX6" y="connsiteY6"/>
+              </a:cxn>
+              <a:cxn ang="0">
+                <a:pos x="connsiteX7" y="connsiteY7"/>
+              </a:cxn>
+              <a:cxn ang="0">
+                <a:pos x="connsiteX8" y="connsiteY8"/>
+              </a:cxn>
+              <a:cxn ang="0">
+                <a:pos x="connsiteX9" y="connsiteY9"/>
+              </a:cxn>
+              <a:cxn ang="0">
+                <a:pos x="connsiteX10" y="connsiteY10"/>
+              </a:cxn>
+              <a:cxn ang="0">
+                <a:pos x="connsiteX11" y="connsiteY11"/>
+              </a:cxn>
+              <a:cxn ang="0">
+                <a:pos x="connsiteX12" y="connsiteY12"/>
+              </a:cxn>
+              <a:cxn ang="0">
+                <a:pos x="connsiteX13" y="connsiteY13"/>
+              </a:cxn>
+              <a:cxn ang="0">
+                <a:pos x="connsiteX14" y="connsiteY14"/>
+              </a:cxn>
+              <a:cxn ang="0">
+                <a:pos x="connsiteX15" y="connsiteY15"/>
+              </a:cxn>
+              <a:cxn ang="0">
+                <a:pos x="connsiteX16" y="connsiteY16"/>
+              </a:cxn>
+              <a:cxn ang="0">
+                <a:pos x="connsiteX17" y="connsiteY17"/>
+              </a:cxn>
+              <a:cxn ang="0">
+                <a:pos x="connsiteX18" y="connsiteY18"/>
+              </a:cxn>
+              <a:cxn ang="0">
+                <a:pos x="connsiteX19" y="connsiteY19"/>
+              </a:cxn>
+              <a:cxn ang="0">
+                <a:pos x="connsiteX20" y="connsiteY20"/>
+              </a:cxn>
+              <a:cxn ang="0">
+                <a:pos x="connsiteX21" y="connsiteY21"/>
+              </a:cxn>
+              <a:cxn ang="0">
+                <a:pos x="connsiteX22" y="connsiteY22"/>
+              </a:cxn>
+              <a:cxn ang="0">
+                <a:pos x="connsiteX23" y="connsiteY23"/>
+              </a:cxn>
+              <a:cxn ang="0">
+                <a:pos x="connsiteX24" y="connsiteY24"/>
+              </a:cxn>
+              <a:cxn ang="0">
+                <a:pos x="connsiteX25" y="connsiteY25"/>
+              </a:cxn>
+            </a:cxnLst>
+            <a:rect l="l" t="t" r="r" b="b"/>
+            <a:pathLst>
+              <a:path w="7072494" h="45719" fill="none" extrusionOk="0">
+                <a:moveTo>
+                  <a:pt x="0" y="0"/>
+                </a:moveTo>
+                <a:cubicBezTo>
+                  <a:pt x="117734" y="1723"/>
+                  <a:pt x="228518" y="4179"/>
+                  <a:pt x="430779" y="0"/>
+                </a:cubicBezTo>
+                <a:cubicBezTo>
+                  <a:pt x="633040" y="-4179"/>
+                  <a:pt x="943030" y="-24616"/>
+                  <a:pt x="1215183" y="0"/>
+                </a:cubicBezTo>
+                <a:cubicBezTo>
+                  <a:pt x="1487336" y="24616"/>
+                  <a:pt x="1620913" y="3431"/>
+                  <a:pt x="1928862" y="0"/>
+                </a:cubicBezTo>
+                <a:cubicBezTo>
+                  <a:pt x="2236811" y="-3431"/>
+                  <a:pt x="2273461" y="21399"/>
+                  <a:pt x="2359641" y="0"/>
+                </a:cubicBezTo>
+                <a:cubicBezTo>
+                  <a:pt x="2445821" y="-21399"/>
+                  <a:pt x="2677306" y="18421"/>
+                  <a:pt x="2931870" y="0"/>
+                </a:cubicBezTo>
+                <a:cubicBezTo>
+                  <a:pt x="3186434" y="-18421"/>
+                  <a:pt x="3397947" y="33809"/>
+                  <a:pt x="3716274" y="0"/>
+                </a:cubicBezTo>
+                <a:cubicBezTo>
+                  <a:pt x="4034601" y="-33809"/>
+                  <a:pt x="4073115" y="-11782"/>
+                  <a:pt x="4359228" y="0"/>
+                </a:cubicBezTo>
+                <a:cubicBezTo>
+                  <a:pt x="4645341" y="11782"/>
+                  <a:pt x="4885361" y="19176"/>
+                  <a:pt x="5072907" y="0"/>
+                </a:cubicBezTo>
+                <a:cubicBezTo>
+                  <a:pt x="5260453" y="-19176"/>
+                  <a:pt x="5467849" y="-21786"/>
+                  <a:pt x="5645136" y="0"/>
+                </a:cubicBezTo>
+                <a:cubicBezTo>
+                  <a:pt x="5822423" y="21786"/>
+                  <a:pt x="6119775" y="30757"/>
+                  <a:pt x="6288090" y="0"/>
+                </a:cubicBezTo>
+                <a:cubicBezTo>
+                  <a:pt x="6456405" y="-30757"/>
+                  <a:pt x="6705044" y="-38477"/>
+                  <a:pt x="7072494" y="0"/>
+                </a:cubicBezTo>
+                <a:cubicBezTo>
+                  <a:pt x="7071607" y="12764"/>
+                  <a:pt x="7071877" y="30199"/>
+                  <a:pt x="7072494" y="45719"/>
+                </a:cubicBezTo>
+                <a:cubicBezTo>
+                  <a:pt x="6864612" y="58352"/>
+                  <a:pt x="6804746" y="26869"/>
+                  <a:pt x="6641715" y="45719"/>
+                </a:cubicBezTo>
+                <a:cubicBezTo>
+                  <a:pt x="6478684" y="64569"/>
+                  <a:pt x="6397989" y="54198"/>
+                  <a:pt x="6210936" y="45719"/>
+                </a:cubicBezTo>
+                <a:cubicBezTo>
+                  <a:pt x="6023883" y="37240"/>
+                  <a:pt x="5730379" y="34380"/>
+                  <a:pt x="5497257" y="45719"/>
+                </a:cubicBezTo>
+                <a:cubicBezTo>
+                  <a:pt x="5264135" y="57058"/>
+                  <a:pt x="5159553" y="36086"/>
+                  <a:pt x="5066478" y="45719"/>
+                </a:cubicBezTo>
+                <a:cubicBezTo>
+                  <a:pt x="4973403" y="55352"/>
+                  <a:pt x="4564848" y="36759"/>
+                  <a:pt x="4423524" y="45719"/>
+                </a:cubicBezTo>
+                <a:cubicBezTo>
+                  <a:pt x="4282200" y="54679"/>
+                  <a:pt x="4071908" y="55881"/>
+                  <a:pt x="3922019" y="45719"/>
+                </a:cubicBezTo>
+                <a:cubicBezTo>
+                  <a:pt x="3772131" y="35557"/>
+                  <a:pt x="3526527" y="67216"/>
+                  <a:pt x="3279065" y="45719"/>
+                </a:cubicBezTo>
+                <a:cubicBezTo>
+                  <a:pt x="3031603" y="24222"/>
+                  <a:pt x="2943809" y="52286"/>
+                  <a:pt x="2636111" y="45719"/>
+                </a:cubicBezTo>
+                <a:cubicBezTo>
+                  <a:pt x="2328413" y="39152"/>
+                  <a:pt x="2201908" y="70181"/>
+                  <a:pt x="1993157" y="45719"/>
+                </a:cubicBezTo>
+                <a:cubicBezTo>
+                  <a:pt x="1784406" y="21257"/>
+                  <a:pt x="1479541" y="20363"/>
+                  <a:pt x="1350203" y="45719"/>
+                </a:cubicBezTo>
+                <a:cubicBezTo>
+                  <a:pt x="1220865" y="71075"/>
+                  <a:pt x="926531" y="54042"/>
+                  <a:pt x="777974" y="45719"/>
+                </a:cubicBezTo>
+                <a:cubicBezTo>
+                  <a:pt x="629417" y="37396"/>
+                  <a:pt x="385106" y="49033"/>
+                  <a:pt x="0" y="45719"/>
+                </a:cubicBezTo>
+                <a:cubicBezTo>
+                  <a:pt x="1417" y="28603"/>
+                  <a:pt x="-172" y="13440"/>
+                  <a:pt x="0" y="0"/>
+                </a:cubicBezTo>
+                <a:close/>
+              </a:path>
+              <a:path w="7072494" h="45719" stroke="0" extrusionOk="0">
+                <a:moveTo>
+                  <a:pt x="0" y="0"/>
+                </a:moveTo>
+                <a:cubicBezTo>
+                  <a:pt x="167711" y="-28052"/>
+                  <a:pt x="301865" y="-28359"/>
+                  <a:pt x="572229" y="0"/>
+                </a:cubicBezTo>
+                <a:cubicBezTo>
+                  <a:pt x="842593" y="28359"/>
+                  <a:pt x="895347" y="8376"/>
+                  <a:pt x="1003008" y="0"/>
+                </a:cubicBezTo>
+                <a:cubicBezTo>
+                  <a:pt x="1110669" y="-8376"/>
+                  <a:pt x="1575021" y="20689"/>
+                  <a:pt x="1787412" y="0"/>
+                </a:cubicBezTo>
+                <a:cubicBezTo>
+                  <a:pt x="1999803" y="-20689"/>
+                  <a:pt x="2082826" y="17742"/>
+                  <a:pt x="2359641" y="0"/>
+                </a:cubicBezTo>
+                <a:cubicBezTo>
+                  <a:pt x="2636456" y="-17742"/>
+                  <a:pt x="2760230" y="24214"/>
+                  <a:pt x="2931870" y="0"/>
+                </a:cubicBezTo>
+                <a:cubicBezTo>
+                  <a:pt x="3103510" y="-24214"/>
+                  <a:pt x="3416128" y="-36638"/>
+                  <a:pt x="3716274" y="0"/>
+                </a:cubicBezTo>
+                <a:cubicBezTo>
+                  <a:pt x="4016420" y="36638"/>
+                  <a:pt x="3982798" y="-19586"/>
+                  <a:pt x="4217778" y="0"/>
+                </a:cubicBezTo>
+                <a:cubicBezTo>
+                  <a:pt x="4452758" y="19586"/>
+                  <a:pt x="4764972" y="-20179"/>
+                  <a:pt x="5002182" y="0"/>
+                </a:cubicBezTo>
+                <a:cubicBezTo>
+                  <a:pt x="5239392" y="20179"/>
+                  <a:pt x="5488831" y="-31446"/>
+                  <a:pt x="5786586" y="0"/>
+                </a:cubicBezTo>
+                <a:cubicBezTo>
+                  <a:pt x="6084341" y="31446"/>
+                  <a:pt x="6207199" y="19642"/>
+                  <a:pt x="6429540" y="0"/>
+                </a:cubicBezTo>
+                <a:cubicBezTo>
+                  <a:pt x="6651881" y="-19642"/>
+                  <a:pt x="6825752" y="-16959"/>
+                  <a:pt x="7072494" y="0"/>
+                </a:cubicBezTo>
+                <a:cubicBezTo>
+                  <a:pt x="7072521" y="15012"/>
+                  <a:pt x="7072674" y="35513"/>
+                  <a:pt x="7072494" y="45719"/>
+                </a:cubicBezTo>
+                <a:cubicBezTo>
+                  <a:pt x="6867960" y="25358"/>
+                  <a:pt x="6808873" y="34818"/>
+                  <a:pt x="6641715" y="45719"/>
+                </a:cubicBezTo>
+                <a:cubicBezTo>
+                  <a:pt x="6474557" y="56620"/>
+                  <a:pt x="6167751" y="53815"/>
+                  <a:pt x="5857311" y="45719"/>
+                </a:cubicBezTo>
+                <a:cubicBezTo>
+                  <a:pt x="5546871" y="37623"/>
+                  <a:pt x="5513760" y="46212"/>
+                  <a:pt x="5355807" y="45719"/>
+                </a:cubicBezTo>
+                <a:cubicBezTo>
+                  <a:pt x="5197854" y="45226"/>
+                  <a:pt x="5011508" y="38396"/>
+                  <a:pt x="4712853" y="45719"/>
+                </a:cubicBezTo>
+                <a:cubicBezTo>
+                  <a:pt x="4414198" y="53042"/>
+                  <a:pt x="4105960" y="40254"/>
+                  <a:pt x="3928449" y="45719"/>
+                </a:cubicBezTo>
+                <a:cubicBezTo>
+                  <a:pt x="3750938" y="51184"/>
+                  <a:pt x="3553246" y="33893"/>
+                  <a:pt x="3285495" y="45719"/>
+                </a:cubicBezTo>
+                <a:cubicBezTo>
+                  <a:pt x="3017744" y="57545"/>
+                  <a:pt x="3047136" y="52688"/>
+                  <a:pt x="2854716" y="45719"/>
+                </a:cubicBezTo>
+                <a:cubicBezTo>
+                  <a:pt x="2662296" y="38750"/>
+                  <a:pt x="2512345" y="36654"/>
+                  <a:pt x="2353212" y="45719"/>
+                </a:cubicBezTo>
+                <a:cubicBezTo>
+                  <a:pt x="2194079" y="54784"/>
+                  <a:pt x="1955367" y="78421"/>
+                  <a:pt x="1568808" y="45719"/>
+                </a:cubicBezTo>
+                <a:cubicBezTo>
+                  <a:pt x="1182249" y="13017"/>
+                  <a:pt x="1183730" y="76339"/>
+                  <a:pt x="925854" y="45719"/>
+                </a:cubicBezTo>
+                <a:cubicBezTo>
+                  <a:pt x="667978" y="15099"/>
+                  <a:pt x="361490" y="66292"/>
+                  <a:pt x="0" y="45719"/>
+                </a:cubicBezTo>
+                <a:cubicBezTo>
+                  <a:pt x="-708" y="32526"/>
+                  <a:pt x="1955" y="18717"/>
+                  <a:pt x="0" y="0"/>
+                </a:cubicBezTo>
+                <a:close/>
+              </a:path>
+            </a:pathLst>
+          </a:custGeom>
+          <a:solidFill>
+            <a:schemeClr val="tx1">
+              <a:lumMod val="85000"/>
+              <a:lumOff val="15000"/>
+            </a:schemeClr>
+          </a:solidFill>
+          <a:ln w="38100" cap="rnd">
+            <a:solidFill>
+              <a:schemeClr val="tx1">
+                <a:lumMod val="85000"/>
+                <a:lumOff val="15000"/>
+              </a:schemeClr>
+            </a:solidFill>
+            <a:round/>
+            <a:extLst>
+              <a:ext uri="{C807C97D-BFC1-408E-A445-0C87EB9F89A2}">
+                <ask:lineSketchStyleProps xmlns:ask="http://schemas.microsoft.com/office/drawing/2018/sketchyshapes" sd="1219033472">
+                  <a:prstGeom prst="rect">
+                    <a:avLst/>
+                  </a:prstGeom>
+                  <ask:type>
+                    <ask:lineSketchFreehand/>
+                  </ask:type>
+                </ask:lineSketchStyleProps>
+              </a:ext>
+            </a:extLst>
+          </a:ln>
+        </p:spPr>
+        <p:style>
+          <a:lnRef idx="2">
+            <a:schemeClr val="accent1">
+              <a:shade val="50000"/>
+            </a:schemeClr>
+          </a:lnRef>
+          <a:fillRef idx="1">
+            <a:schemeClr val="accent1"/>
+          </a:fillRef>
+          <a:effectRef idx="0">
+            <a:schemeClr val="accent1"/>
+          </a:effectRef>
+          <a:fontRef idx="minor">
+            <a:schemeClr val="lt1"/>
+          </a:fontRef>
+        </p:style>
+        <p:txBody>
+          <a:bodyPr rtlCol="0" anchor="ctr"/>
+          <a:lstStyle/>
+          <a:p>
+            <a:pPr algn="ctr"/>
+            <a:endParaRPr lang="en-US"/>
+          </a:p>
+        </p:txBody>
+      </p:sp>
+      <p:grpSp>
+        <p:nvGrpSpPr>
+          <p:cNvPr id="11" name="Group 10">
+            <a:extLst>
+              <a:ext uri="{FF2B5EF4-FFF2-40B4-BE49-F238E27FC236}">
+                <a16:creationId xmlns:a16="http://schemas.microsoft.com/office/drawing/2014/main" id="{6F3CBE1F-EBF8-DD72-4E3E-3760616940E0}"/>
+              </a:ext>
+            </a:extLst>
+          </p:cNvPr>
+          <p:cNvGrpSpPr/>
+          <p:nvPr/>
+        </p:nvGrpSpPr>
+        <p:grpSpPr>
+          <a:xfrm>
+            <a:off x="0" y="0"/>
+            <a:ext cx="12832956" cy="6857990"/>
+            <a:chOff x="0" y="0"/>
+            <a:chExt cx="12832956" cy="6857990"/>
+          </a:xfrm>
+        </p:grpSpPr>
+        <p:grpSp>
+          <p:nvGrpSpPr>
+            <p:cNvPr id="7" name="Group 6">
+              <a:extLst>
+                <a:ext uri="{FF2B5EF4-FFF2-40B4-BE49-F238E27FC236}">
+                  <a16:creationId xmlns:a16="http://schemas.microsoft.com/office/drawing/2014/main" id="{1E619CC1-B785-71C0-DB48-5CB99DB67E37}"/>
+                </a:ext>
+              </a:extLst>
+            </p:cNvPr>
+            <p:cNvGrpSpPr/>
+            <p:nvPr/>
+          </p:nvGrpSpPr>
+          <p:grpSpPr>
+            <a:xfrm>
+              <a:off x="0" y="0"/>
+              <a:ext cx="12832956" cy="6857990"/>
+              <a:chOff x="0" y="0"/>
+              <a:chExt cx="12832956" cy="6857990"/>
+            </a:xfrm>
+          </p:grpSpPr>
+          <p:sp>
+            <p:nvSpPr>
+              <p:cNvPr id="4" name="Rectangle 3">
+                <a:extLst>
+                  <a:ext uri="{FF2B5EF4-FFF2-40B4-BE49-F238E27FC236}">
+                    <a16:creationId xmlns:a16="http://schemas.microsoft.com/office/drawing/2014/main" id="{4677613D-2CF3-2186-5B03-D804003C57D9}"/>
+                  </a:ext>
+                </a:extLst>
+              </p:cNvPr>
+              <p:cNvSpPr/>
+              <p:nvPr/>
+            </p:nvSpPr>
+            <p:spPr>
+              <a:xfrm>
+                <a:off x="0" y="0"/>
+                <a:ext cx="12192000" cy="6857990"/>
+              </a:xfrm>
+              <a:prstGeom prst="rect">
+                <a:avLst/>
+              </a:prstGeom>
+              <a:solidFill>
+                <a:schemeClr val="tx1">
+                  <a:alpha val="50000"/>
+                </a:schemeClr>
+              </a:solidFill>
+            </p:spPr>
+            <p:style>
+              <a:lnRef idx="2">
+                <a:schemeClr val="accent1">
+                  <a:shade val="50000"/>
+                </a:schemeClr>
+              </a:lnRef>
+              <a:fillRef idx="1">
+                <a:schemeClr val="accent1"/>
+              </a:fillRef>
+              <a:effectRef idx="0">
+                <a:schemeClr val="accent1"/>
+              </a:effectRef>
+              <a:fontRef idx="minor">
+                <a:schemeClr val="lt1"/>
+              </a:fontRef>
+            </p:style>
+            <p:txBody>
+              <a:bodyPr rtlCol="0" anchor="ctr"/>
+              <a:lstStyle/>
+              <a:p>
+                <a:pPr algn="ctr"/>
+                <a:endParaRPr lang="en-US" dirty="0"/>
+              </a:p>
+            </p:txBody>
+          </p:sp>
+          <p:pic>
+            <p:nvPicPr>
+              <p:cNvPr id="6" name="Picture 5" descr="Logo&#10;&#10;Description automatically generated">
+                <a:extLst>
+                  <a:ext uri="{FF2B5EF4-FFF2-40B4-BE49-F238E27FC236}">
+                    <a16:creationId xmlns:a16="http://schemas.microsoft.com/office/drawing/2014/main" id="{F7C093BB-1E60-4072-6393-C8A349B74640}"/>
+                  </a:ext>
+                </a:extLst>
+              </p:cNvPr>
+              <p:cNvPicPr>
+                <a:picLocks noChangeAspect="1"/>
+              </p:cNvPicPr>
+              <p:nvPr/>
+            </p:nvPicPr>
+            <p:blipFill>
+              <a:blip r:embed="rId3">
+                <a:extLst>
+                  <a:ext uri="{28A0092B-C50C-407E-A947-70E740481C1C}">
+                    <a14:useLocalDpi xmlns:a14="http://schemas.microsoft.com/office/drawing/2010/main" val="0"/>
+                  </a:ext>
+                </a:extLst>
+              </a:blip>
+              <a:stretch>
+                <a:fillRect/>
+              </a:stretch>
+            </p:blipFill>
+            <p:spPr>
+              <a:xfrm>
+                <a:off x="6406126" y="4076875"/>
+                <a:ext cx="6426830" cy="2670732"/>
+              </a:xfrm>
+              <a:prstGeom prst="rect">
+                <a:avLst/>
+              </a:prstGeom>
+            </p:spPr>
+          </p:pic>
+        </p:grpSp>
+        <p:sp>
+          <p:nvSpPr>
+            <p:cNvPr id="9" name="TextBox 8">
+              <a:extLst>
+                <a:ext uri="{FF2B5EF4-FFF2-40B4-BE49-F238E27FC236}">
+                  <a16:creationId xmlns:a16="http://schemas.microsoft.com/office/drawing/2014/main" id="{6C7C7FB8-4FB9-DC65-F783-40FAAA44FEFC}"/>
+                </a:ext>
+              </a:extLst>
+            </p:cNvPr>
+            <p:cNvSpPr txBox="1"/>
+            <p:nvPr/>
+          </p:nvSpPr>
+          <p:spPr>
+            <a:xfrm>
+              <a:off x="7087253" y="5977142"/>
+              <a:ext cx="5061528" cy="738664"/>
+            </a:xfrm>
+            <a:prstGeom prst="rect">
+              <a:avLst/>
+            </a:prstGeom>
+            <a:noFill/>
+          </p:spPr>
+          <p:txBody>
+            <a:bodyPr wrap="square" rtlCol="0">
+              <a:spAutoFit/>
+            </a:bodyPr>
+            <a:lstStyle/>
+            <a:p>
+              <a:r>
+                <a:rPr lang="en-US" sz="4200" dirty="0">
+                  <a:solidFill>
+                    <a:schemeClr val="bg1"/>
+                  </a:solidFill>
+                  <a:latin typeface="Amasis MT Pro Black" panose="020B0604020202020204" pitchFamily="18" charset="0"/>
+                </a:rPr>
+                <a:t>@GordonBeeming</a:t>
+              </a:r>
+            </a:p>
+          </p:txBody>
+        </p:sp>
+      </p:grpSp>
+    </p:spTree>
+    <p:extLst>
+      <p:ext uri="{BB962C8B-B14F-4D97-AF65-F5344CB8AC3E}">
+        <p14:creationId xmlns:p14="http://schemas.microsoft.com/office/powerpoint/2010/main" val="2731937226"/>
+      </p:ext>
+    </p:extLst>
+  </p:cSld>
+  <p:clrMapOvr>
+    <a:masterClrMapping/>
+  </p:clrMapOvr>
+</p:sld>
+</file>
+
 <file path=ppt/theme/theme1.xml><?xml version="1.0" encoding="utf-8"?>
 <a:theme xmlns:a="http://schemas.openxmlformats.org/drawingml/2006/main" name="SketchyVTI">
   <a:themeElements>

</xml_diff>